<commit_message>
Adicionei parte dos dialogs.
</commit_message>
<xml_diff>
--- a/ButecoCalc/Calculadora de Buteco - V2.0_rara.pptx
+++ b/ButecoCalc/Calculadora de Buteco - V2.0_rara.pptx
@@ -4754,7 +4754,6 @@
               <a:rPr lang="pt-BR" dirty="0" smtClean="0"/>
               <a:t> Item</a:t>
             </a:r>
-            <a:endParaRPr lang="pt-BR" dirty="0" smtClean="0"/>
           </a:p>
           <a:p>
             <a:pPr marL="457200" indent="-457200" algn="l">
@@ -5371,6 +5370,14 @@
           <a:prstGeom prst="rect">
             <a:avLst/>
           </a:prstGeom>
+          <a:solidFill>
+            <a:srgbClr val="00B0F0"/>
+          </a:solidFill>
+          <a:ln>
+            <a:solidFill>
+              <a:schemeClr val="bg1"/>
+            </a:solidFill>
+          </a:ln>
         </p:spPr>
         <p:style>
           <a:lnRef idx="2">
@@ -5406,7 +5413,7 @@
           <p:nvPr/>
         </p:nvGraphicFramePr>
         <p:xfrm>
-          <a:off x="5436096" y="548680"/>
+          <a:off x="5436096" y="418732"/>
           <a:ext cx="3168352" cy="1684705"/>
         </p:xfrm>
         <a:graphic>
@@ -5516,8 +5523,8 @@
         </p:nvSpPr>
         <p:spPr>
           <a:xfrm>
-            <a:off x="5436096" y="2276872"/>
-            <a:ext cx="1512168" cy="504056"/>
+            <a:off x="5436096" y="2146924"/>
+            <a:ext cx="1512168" cy="360040"/>
           </a:xfrm>
           <a:prstGeom prst="roundRect">
             <a:avLst/>
@@ -5558,8 +5565,8 @@
         </p:nvSpPr>
         <p:spPr>
           <a:xfrm>
-            <a:off x="7092280" y="2276872"/>
-            <a:ext cx="1512168" cy="504056"/>
+            <a:off x="7092280" y="2146924"/>
+            <a:ext cx="1512168" cy="360040"/>
           </a:xfrm>
           <a:prstGeom prst="roundRect">
             <a:avLst/>
@@ -5600,7 +5607,7 @@
         </p:nvGrpSpPr>
         <p:grpSpPr>
           <a:xfrm>
-            <a:off x="6660232" y="620688"/>
+            <a:off x="6660232" y="490740"/>
             <a:ext cx="1872208" cy="1512168"/>
             <a:chOff x="6660232" y="1628800"/>
             <a:chExt cx="1872208" cy="1512168"/>
@@ -5752,8 +5759,8 @@
           <p:nvPr/>
         </p:nvGraphicFramePr>
         <p:xfrm>
-          <a:off x="5436096" y="2996952"/>
-          <a:ext cx="3168351" cy="2918149"/>
+          <a:off x="5436096" y="2708922"/>
+          <a:ext cx="3168351" cy="3232585"/>
         </p:xfrm>
         <a:graphic>
           <a:graphicData uri="http://schemas.openxmlformats.org/drawingml/2006/table">
@@ -5766,21 +5773,21 @@
                 <a:gridCol w="767399"/>
                 <a:gridCol w="1176816"/>
               </a:tblGrid>
-              <a:tr h="504056">
+              <a:tr h="432002">
                 <a:tc>
                   <a:txBody>
                     <a:bodyPr/>
                     <a:lstStyle/>
                     <a:p>
                       <a:r>
-                        <a:rPr lang="en-US" dirty="0" err="1" smtClean="0"/>
+                        <a:rPr lang="en-US" b="0" dirty="0" err="1" smtClean="0"/>
                         <a:t>Cerveja</a:t>
                       </a:r>
                       <a:r>
-                        <a:rPr lang="en-US" dirty="0" smtClean="0"/>
+                        <a:rPr lang="en-US" b="0" dirty="0" smtClean="0"/>
                         <a:t> 1</a:t>
                       </a:r>
-                      <a:endParaRPr lang="pt-BR" dirty="0"/>
+                      <a:endParaRPr lang="pt-BR" b="0" dirty="0"/>
                     </a:p>
                   </a:txBody>
                   <a:tcPr anchor="ctr"/>
@@ -5810,7 +5817,7 @@
                   <a:tcPr anchor="ctr"/>
                 </a:tc>
               </a:tr>
-              <a:tr h="593364">
+              <a:tr h="508544">
                 <a:tc>
                   <a:txBody>
                     <a:bodyPr/>
@@ -5850,7 +5857,7 @@
                   <a:tcPr anchor="ctr"/>
                 </a:tc>
               </a:tr>
-              <a:tr h="540569">
+              <a:tr h="463296">
                 <a:tc>
                   <a:txBody>
                     <a:bodyPr/>
@@ -5890,7 +5897,7 @@
                   <a:tcPr anchor="ctr"/>
                 </a:tc>
               </a:tr>
-              <a:tr h="540569">
+              <a:tr h="540372">
                 <a:tc>
                   <a:txBody>
                     <a:bodyPr/>
@@ -5942,7 +5949,7 @@
                   <a:tcPr anchor="ctr"/>
                 </a:tc>
               </a:tr>
-              <a:tr h="540569">
+              <a:tr h="476356">
                 <a:tc>
                   <a:txBody>
                     <a:bodyPr/>
@@ -5981,6 +5988,46 @@
                       <a:r>
                         <a:rPr lang="en-US" dirty="0" smtClean="0"/>
                         <a:t>11,0</a:t>
+                      </a:r>
+                      <a:endParaRPr lang="pt-BR" dirty="0"/>
+                    </a:p>
+                  </a:txBody>
+                  <a:tcPr anchor="ctr"/>
+                </a:tc>
+                <a:tc>
+                  <a:txBody>
+                    <a:bodyPr/>
+                    <a:lstStyle/>
+                    <a:p>
+                      <a:endParaRPr lang="pt-BR" dirty="0"/>
+                    </a:p>
+                  </a:txBody>
+                  <a:tcPr anchor="ctr"/>
+                </a:tc>
+              </a:tr>
+              <a:tr h="548583">
+                <a:tc>
+                  <a:txBody>
+                    <a:bodyPr/>
+                    <a:lstStyle/>
+                    <a:p>
+                      <a:r>
+                        <a:rPr lang="en-US" dirty="0" err="1" smtClean="0"/>
+                        <a:t>picanha</a:t>
+                      </a:r>
+                      <a:endParaRPr lang="pt-BR" dirty="0"/>
+                    </a:p>
+                  </a:txBody>
+                  <a:tcPr anchor="ctr"/>
+                </a:tc>
+                <a:tc>
+                  <a:txBody>
+                    <a:bodyPr/>
+                    <a:lstStyle/>
+                    <a:p>
+                      <a:r>
+                        <a:rPr lang="en-US" dirty="0" smtClean="0"/>
+                        <a:t>38,5</a:t>
                       </a:r>
                       <a:endParaRPr lang="pt-BR" dirty="0"/>
                     </a:p>
@@ -6100,8 +6147,8 @@
         </p:nvSpPr>
         <p:spPr>
           <a:xfrm>
-            <a:off x="6372200" y="6021288"/>
-            <a:ext cx="1512168" cy="504056"/>
+            <a:off x="6372200" y="6165304"/>
+            <a:ext cx="1512168" cy="360040"/>
           </a:xfrm>
           <a:prstGeom prst="roundRect">
             <a:avLst/>
@@ -6150,8 +6197,8 @@
         </p:blipFill>
         <p:spPr>
           <a:xfrm>
-            <a:off x="7668344" y="3761422"/>
-            <a:ext cx="504056" cy="531930"/>
+            <a:off x="7762992" y="3212976"/>
+            <a:ext cx="409408" cy="432048"/>
           </a:xfrm>
           <a:prstGeom prst="rect">
             <a:avLst/>
@@ -6174,8 +6221,8 @@
         </p:blipFill>
         <p:spPr>
           <a:xfrm>
-            <a:off x="7668344" y="4356226"/>
-            <a:ext cx="475053" cy="475053"/>
+            <a:off x="7855365" y="3717033"/>
+            <a:ext cx="360040" cy="360040"/>
           </a:xfrm>
           <a:prstGeom prst="rect">
             <a:avLst/>
@@ -6198,8 +6245,80 @@
         </p:blipFill>
         <p:spPr>
           <a:xfrm>
-            <a:off x="7639743" y="3239610"/>
-            <a:ext cx="576064" cy="451326"/>
+            <a:off x="7731652" y="2761650"/>
+            <a:ext cx="484154" cy="379318"/>
+          </a:xfrm>
+          <a:prstGeom prst="rect">
+            <a:avLst/>
+          </a:prstGeom>
+        </p:spPr>
+      </p:pic>
+      <p:pic>
+        <p:nvPicPr>
+          <p:cNvPr id="24" name="Imagem 23" descr="batata_frita-11730.gif"/>
+          <p:cNvPicPr>
+            <a:picLocks noChangeAspect="1"/>
+          </p:cNvPicPr>
+          <p:nvPr/>
+        </p:nvPicPr>
+        <p:blipFill>
+          <a:blip r:embed="rId7" cstate="print"/>
+          <a:stretch>
+            <a:fillRect/>
+          </a:stretch>
+        </p:blipFill>
+        <p:spPr>
+          <a:xfrm>
+            <a:off x="7668344" y="4149080"/>
+            <a:ext cx="592460" cy="559875"/>
+          </a:xfrm>
+          <a:prstGeom prst="rect">
+            <a:avLst/>
+          </a:prstGeom>
+        </p:spPr>
+      </p:pic>
+      <p:pic>
+        <p:nvPicPr>
+          <p:cNvPr id="25" name="Imagem 24" descr="batata_frita-11730.gif"/>
+          <p:cNvPicPr>
+            <a:picLocks noChangeAspect="1"/>
+          </p:cNvPicPr>
+          <p:nvPr/>
+        </p:nvPicPr>
+        <p:blipFill>
+          <a:blip r:embed="rId7" cstate="print"/>
+          <a:stretch>
+            <a:fillRect/>
+          </a:stretch>
+        </p:blipFill>
+        <p:spPr>
+          <a:xfrm>
+            <a:off x="7668344" y="4797152"/>
+            <a:ext cx="592460" cy="559875"/>
+          </a:xfrm>
+          <a:prstGeom prst="rect">
+            <a:avLst/>
+          </a:prstGeom>
+        </p:spPr>
+      </p:pic>
+      <p:pic>
+        <p:nvPicPr>
+          <p:cNvPr id="26" name="Imagem 25" descr="churrasco.jpg"/>
+          <p:cNvPicPr>
+            <a:picLocks noChangeAspect="1"/>
+          </p:cNvPicPr>
+          <p:nvPr/>
+        </p:nvPicPr>
+        <p:blipFill>
+          <a:blip r:embed="rId8" cstate="print"/>
+          <a:stretch>
+            <a:fillRect/>
+          </a:stretch>
+        </p:blipFill>
+        <p:spPr>
+          <a:xfrm>
+            <a:off x="7740352" y="5445224"/>
+            <a:ext cx="551459" cy="432048"/>
           </a:xfrm>
           <a:prstGeom prst="rect">
             <a:avLst/>
@@ -6892,6 +7011,14 @@
           <a:prstGeom prst="rect">
             <a:avLst/>
           </a:prstGeom>
+          <a:solidFill>
+            <a:srgbClr val="00B0F0"/>
+          </a:solidFill>
+          <a:ln>
+            <a:solidFill>
+              <a:schemeClr val="bg1"/>
+            </a:solidFill>
+          </a:ln>
         </p:spPr>
         <p:style>
           <a:lnRef idx="2">
@@ -6996,90 +7123,6 @@
           </a:graphicData>
         </a:graphic>
       </p:graphicFrame>
-      <p:sp>
-        <p:nvSpPr>
-          <p:cNvPr id="14" name="Retângulo de cantos arredondados 13"/>
-          <p:cNvSpPr/>
-          <p:nvPr/>
-        </p:nvSpPr>
-        <p:spPr>
-          <a:xfrm>
-            <a:off x="5436096" y="1772816"/>
-            <a:ext cx="1512168" cy="504056"/>
-          </a:xfrm>
-          <a:prstGeom prst="roundRect">
-            <a:avLst/>
-          </a:prstGeom>
-        </p:spPr>
-        <p:style>
-          <a:lnRef idx="1">
-            <a:schemeClr val="accent2"/>
-          </a:lnRef>
-          <a:fillRef idx="3">
-            <a:schemeClr val="accent2"/>
-          </a:fillRef>
-          <a:effectRef idx="2">
-            <a:schemeClr val="accent2"/>
-          </a:effectRef>
-          <a:fontRef idx="minor">
-            <a:schemeClr val="lt1"/>
-          </a:fontRef>
-        </p:style>
-        <p:txBody>
-          <a:bodyPr rtlCol="0" anchor="ctr"/>
-          <a:lstStyle/>
-          <a:p>
-            <a:pPr algn="ctr"/>
-            <a:r>
-              <a:rPr lang="en-US" dirty="0" err="1" smtClean="0"/>
-              <a:t>Salvar</a:t>
-            </a:r>
-            <a:endParaRPr lang="pt-BR" dirty="0"/>
-          </a:p>
-        </p:txBody>
-      </p:sp>
-      <p:sp>
-        <p:nvSpPr>
-          <p:cNvPr id="15" name="Retângulo de cantos arredondados 14"/>
-          <p:cNvSpPr/>
-          <p:nvPr/>
-        </p:nvSpPr>
-        <p:spPr>
-          <a:xfrm>
-            <a:off x="7092280" y="1772816"/>
-            <a:ext cx="1512168" cy="504056"/>
-          </a:xfrm>
-          <a:prstGeom prst="roundRect">
-            <a:avLst/>
-          </a:prstGeom>
-        </p:spPr>
-        <p:style>
-          <a:lnRef idx="1">
-            <a:schemeClr val="accent2"/>
-          </a:lnRef>
-          <a:fillRef idx="3">
-            <a:schemeClr val="accent2"/>
-          </a:fillRef>
-          <a:effectRef idx="2">
-            <a:schemeClr val="accent2"/>
-          </a:effectRef>
-          <a:fontRef idx="minor">
-            <a:schemeClr val="lt1"/>
-          </a:fontRef>
-        </p:style>
-        <p:txBody>
-          <a:bodyPr rtlCol="0" anchor="ctr"/>
-          <a:lstStyle/>
-          <a:p>
-            <a:pPr algn="ctr"/>
-            <a:r>
-              <a:rPr lang="en-US" smtClean="0"/>
-              <a:t>Cancelar</a:t>
-            </a:r>
-            <a:endParaRPr lang="pt-BR" dirty="0"/>
-          </a:p>
-        </p:txBody>
-      </p:sp>
       <p:sp>
         <p:nvSpPr>
           <p:cNvPr id="10" name="CaixaDeTexto 9"/>
@@ -7425,14 +7468,14 @@
       </p:grpSp>
       <p:sp>
         <p:nvSpPr>
-          <p:cNvPr id="29" name="Retângulo de cantos arredondados 28"/>
+          <p:cNvPr id="19" name="Retângulo de cantos arredondados 18"/>
           <p:cNvSpPr/>
           <p:nvPr/>
         </p:nvSpPr>
         <p:spPr>
           <a:xfrm>
-            <a:off x="6372200" y="6021288"/>
-            <a:ext cx="1512168" cy="504056"/>
+            <a:off x="5436096" y="1700808"/>
+            <a:ext cx="1512168" cy="360040"/>
           </a:xfrm>
           <a:prstGeom prst="roundRect">
             <a:avLst/>
@@ -7459,9 +7502,293 @@
             <a:pPr algn="ctr"/>
             <a:r>
               <a:rPr lang="en-US" dirty="0" err="1" smtClean="0"/>
+              <a:t>Salvar</a:t>
+            </a:r>
+            <a:endParaRPr lang="pt-BR" dirty="0"/>
+          </a:p>
+        </p:txBody>
+      </p:sp>
+      <p:sp>
+        <p:nvSpPr>
+          <p:cNvPr id="23" name="Retângulo de cantos arredondados 22"/>
+          <p:cNvSpPr/>
+          <p:nvPr/>
+        </p:nvSpPr>
+        <p:spPr>
+          <a:xfrm>
+            <a:off x="7092280" y="1700808"/>
+            <a:ext cx="1512168" cy="360040"/>
+          </a:xfrm>
+          <a:prstGeom prst="roundRect">
+            <a:avLst/>
+          </a:prstGeom>
+        </p:spPr>
+        <p:style>
+          <a:lnRef idx="1">
+            <a:schemeClr val="accent2"/>
+          </a:lnRef>
+          <a:fillRef idx="3">
+            <a:schemeClr val="accent2"/>
+          </a:fillRef>
+          <a:effectRef idx="2">
+            <a:schemeClr val="accent2"/>
+          </a:effectRef>
+          <a:fontRef idx="minor">
+            <a:schemeClr val="lt1"/>
+          </a:fontRef>
+        </p:style>
+        <p:txBody>
+          <a:bodyPr rtlCol="0" anchor="ctr"/>
+          <a:lstStyle/>
+          <a:p>
+            <a:pPr algn="ctr"/>
+            <a:r>
+              <a:rPr lang="en-US" dirty="0" err="1" smtClean="0"/>
+              <a:t>Cancelar</a:t>
+            </a:r>
+            <a:endParaRPr lang="pt-BR" dirty="0"/>
+          </a:p>
+        </p:txBody>
+      </p:sp>
+      <p:sp>
+        <p:nvSpPr>
+          <p:cNvPr id="24" name="Retângulo de cantos arredondados 23"/>
+          <p:cNvSpPr/>
+          <p:nvPr/>
+        </p:nvSpPr>
+        <p:spPr>
+          <a:xfrm>
+            <a:off x="6372200" y="6165304"/>
+            <a:ext cx="1512168" cy="360040"/>
+          </a:xfrm>
+          <a:prstGeom prst="roundRect">
+            <a:avLst/>
+          </a:prstGeom>
+        </p:spPr>
+        <p:style>
+          <a:lnRef idx="1">
+            <a:schemeClr val="accent2"/>
+          </a:lnRef>
+          <a:fillRef idx="3">
+            <a:schemeClr val="accent2"/>
+          </a:fillRef>
+          <a:effectRef idx="2">
+            <a:schemeClr val="accent2"/>
+          </a:effectRef>
+          <a:fontRef idx="minor">
+            <a:schemeClr val="lt1"/>
+          </a:fontRef>
+        </p:style>
+        <p:txBody>
+          <a:bodyPr rtlCol="0" anchor="ctr"/>
+          <a:lstStyle/>
+          <a:p>
+            <a:pPr algn="ctr"/>
+            <a:r>
+              <a:rPr lang="en-US" dirty="0" err="1" smtClean="0"/>
               <a:t>Fechar</a:t>
             </a:r>
             <a:endParaRPr lang="pt-BR" dirty="0"/>
+          </a:p>
+        </p:txBody>
+      </p:sp>
+      <p:sp>
+        <p:nvSpPr>
+          <p:cNvPr id="25" name="Rosto feliz 24"/>
+          <p:cNvSpPr/>
+          <p:nvPr/>
+        </p:nvSpPr>
+        <p:spPr>
+          <a:xfrm>
+            <a:off x="7380312" y="3068960"/>
+            <a:ext cx="504056" cy="360040"/>
+          </a:xfrm>
+          <a:prstGeom prst="smileyFace">
+            <a:avLst/>
+          </a:prstGeom>
+        </p:spPr>
+        <p:style>
+          <a:lnRef idx="2">
+            <a:schemeClr val="accent1">
+              <a:shade val="50000"/>
+            </a:schemeClr>
+          </a:lnRef>
+          <a:fillRef idx="1">
+            <a:schemeClr val="accent1"/>
+          </a:fillRef>
+          <a:effectRef idx="0">
+            <a:schemeClr val="accent1"/>
+          </a:effectRef>
+          <a:fontRef idx="minor">
+            <a:schemeClr val="lt1"/>
+          </a:fontRef>
+        </p:style>
+        <p:txBody>
+          <a:bodyPr rtlCol="0" anchor="ctr"/>
+          <a:lstStyle/>
+          <a:p>
+            <a:pPr algn="ctr"/>
+            <a:endParaRPr lang="pt-BR"/>
+          </a:p>
+        </p:txBody>
+      </p:sp>
+      <p:sp>
+        <p:nvSpPr>
+          <p:cNvPr id="26" name="Rosto feliz 25"/>
+          <p:cNvSpPr/>
+          <p:nvPr/>
+        </p:nvSpPr>
+        <p:spPr>
+          <a:xfrm>
+            <a:off x="7380312" y="3645024"/>
+            <a:ext cx="504056" cy="360040"/>
+          </a:xfrm>
+          <a:prstGeom prst="smileyFace">
+            <a:avLst/>
+          </a:prstGeom>
+        </p:spPr>
+        <p:style>
+          <a:lnRef idx="3">
+            <a:schemeClr val="lt1"/>
+          </a:lnRef>
+          <a:fillRef idx="1">
+            <a:schemeClr val="accent6"/>
+          </a:fillRef>
+          <a:effectRef idx="1">
+            <a:schemeClr val="accent6"/>
+          </a:effectRef>
+          <a:fontRef idx="minor">
+            <a:schemeClr val="lt1"/>
+          </a:fontRef>
+        </p:style>
+        <p:txBody>
+          <a:bodyPr rtlCol="0" anchor="ctr"/>
+          <a:lstStyle/>
+          <a:p>
+            <a:pPr algn="ctr"/>
+            <a:endParaRPr lang="pt-BR"/>
+          </a:p>
+        </p:txBody>
+      </p:sp>
+      <p:sp>
+        <p:nvSpPr>
+          <p:cNvPr id="27" name="Rosto feliz 26"/>
+          <p:cNvSpPr/>
+          <p:nvPr/>
+        </p:nvSpPr>
+        <p:spPr>
+          <a:xfrm>
+            <a:off x="7380312" y="4191284"/>
+            <a:ext cx="504056" cy="360040"/>
+          </a:xfrm>
+          <a:prstGeom prst="smileyFace">
+            <a:avLst>
+              <a:gd name="adj" fmla="val 4653"/>
+            </a:avLst>
+          </a:prstGeom>
+        </p:spPr>
+        <p:style>
+          <a:lnRef idx="2">
+            <a:schemeClr val="accent3">
+              <a:shade val="50000"/>
+            </a:schemeClr>
+          </a:lnRef>
+          <a:fillRef idx="1">
+            <a:schemeClr val="accent3"/>
+          </a:fillRef>
+          <a:effectRef idx="0">
+            <a:schemeClr val="accent3"/>
+          </a:effectRef>
+          <a:fontRef idx="minor">
+            <a:schemeClr val="lt1"/>
+          </a:fontRef>
+        </p:style>
+        <p:txBody>
+          <a:bodyPr rtlCol="0" anchor="ctr"/>
+          <a:lstStyle/>
+          <a:p>
+            <a:pPr algn="ctr"/>
+            <a:endParaRPr lang="pt-BR"/>
+          </a:p>
+        </p:txBody>
+      </p:sp>
+      <p:sp>
+        <p:nvSpPr>
+          <p:cNvPr id="28" name="Rosto feliz 27"/>
+          <p:cNvSpPr/>
+          <p:nvPr/>
+        </p:nvSpPr>
+        <p:spPr>
+          <a:xfrm>
+            <a:off x="7380312" y="4725144"/>
+            <a:ext cx="504056" cy="360040"/>
+          </a:xfrm>
+          <a:prstGeom prst="smileyFace">
+            <a:avLst/>
+          </a:prstGeom>
+        </p:spPr>
+        <p:style>
+          <a:lnRef idx="2">
+            <a:schemeClr val="accent4">
+              <a:shade val="50000"/>
+            </a:schemeClr>
+          </a:lnRef>
+          <a:fillRef idx="1">
+            <a:schemeClr val="accent4"/>
+          </a:fillRef>
+          <a:effectRef idx="0">
+            <a:schemeClr val="accent4"/>
+          </a:effectRef>
+          <a:fontRef idx="minor">
+            <a:schemeClr val="lt1"/>
+          </a:fontRef>
+        </p:style>
+        <p:txBody>
+          <a:bodyPr rtlCol="0" anchor="ctr"/>
+          <a:lstStyle/>
+          <a:p>
+            <a:pPr algn="ctr"/>
+            <a:endParaRPr lang="pt-BR"/>
+          </a:p>
+        </p:txBody>
+      </p:sp>
+      <p:sp>
+        <p:nvSpPr>
+          <p:cNvPr id="30" name="Rosto feliz 29"/>
+          <p:cNvSpPr/>
+          <p:nvPr/>
+        </p:nvSpPr>
+        <p:spPr>
+          <a:xfrm>
+            <a:off x="7380312" y="5229200"/>
+            <a:ext cx="504056" cy="360040"/>
+          </a:xfrm>
+          <a:prstGeom prst="smileyFace">
+            <a:avLst/>
+          </a:prstGeom>
+        </p:spPr>
+        <p:style>
+          <a:lnRef idx="2">
+            <a:schemeClr val="accent2">
+              <a:shade val="50000"/>
+            </a:schemeClr>
+          </a:lnRef>
+          <a:fillRef idx="1">
+            <a:schemeClr val="accent2"/>
+          </a:fillRef>
+          <a:effectRef idx="0">
+            <a:schemeClr val="accent2"/>
+          </a:effectRef>
+          <a:fontRef idx="minor">
+            <a:schemeClr val="lt1"/>
+          </a:fontRef>
+        </p:style>
+        <p:txBody>
+          <a:bodyPr rtlCol="0" anchor="ctr"/>
+          <a:lstStyle/>
+          <a:p>
+            <a:pPr algn="ctr"/>
+            <a:endParaRPr lang="pt-BR"/>
           </a:p>
         </p:txBody>
       </p:sp>
@@ -7520,13 +7847,8 @@
             <a:pPr algn="l"/>
             <a:r>
               <a:rPr lang="pt-BR" dirty="0" smtClean="0"/>
-              <a:t>Tela </a:t>
-            </a:r>
-            <a:r>
-              <a:rPr lang="pt-BR" dirty="0" smtClean="0"/>
-              <a:t>Fechar a conta</a:t>
-            </a:r>
-            <a:endParaRPr lang="pt-BR" dirty="0" smtClean="0"/>
+              <a:t>Tela Fechar a conta</a:t>
+            </a:r>
           </a:p>
           <a:p>
             <a:pPr marL="914400" lvl="1" indent="-457200" algn="l">
@@ -8167,6 +8489,14 @@
           <a:prstGeom prst="rect">
             <a:avLst/>
           </a:prstGeom>
+          <a:solidFill>
+            <a:srgbClr val="00B0F0"/>
+          </a:solidFill>
+          <a:ln>
+            <a:solidFill>
+              <a:schemeClr val="bg1"/>
+            </a:solidFill>
+          </a:ln>
         </p:spPr>
         <p:style>
           <a:lnRef idx="2">
@@ -8201,7 +8531,7 @@
         </p:nvSpPr>
         <p:spPr>
           <a:xfrm>
-            <a:off x="5436096" y="3861048"/>
+            <a:off x="5436096" y="4581128"/>
             <a:ext cx="1512168" cy="504056"/>
           </a:xfrm>
           <a:prstGeom prst="roundRect">
@@ -8243,7 +8573,7 @@
         </p:nvSpPr>
         <p:spPr>
           <a:xfrm>
-            <a:off x="7092280" y="3861048"/>
+            <a:off x="7092280" y="4581128"/>
             <a:ext cx="1512168" cy="504056"/>
           </a:xfrm>
           <a:prstGeom prst="roundRect">
@@ -8285,8 +8615,8 @@
         </p:nvGrpSpPr>
         <p:grpSpPr>
           <a:xfrm>
-            <a:off x="8686318" y="773582"/>
-            <a:ext cx="206162" cy="2943450"/>
+            <a:off x="8676456" y="773582"/>
+            <a:ext cx="288032" cy="3663530"/>
             <a:chOff x="8604448" y="3501008"/>
             <a:chExt cx="0" cy="2736304"/>
           </a:xfrm>
@@ -8377,7 +8707,7 @@
         </p:nvGraphicFramePr>
         <p:xfrm>
           <a:off x="5436096" y="764704"/>
-          <a:ext cx="3168352" cy="2952329"/>
+          <a:ext cx="3168352" cy="3622768"/>
         </p:xfrm>
         <a:graphic>
           <a:graphicData uri="http://schemas.openxmlformats.org/drawingml/2006/table">
@@ -8396,14 +8726,14 @@
                     <a:lstStyle/>
                     <a:p>
                       <a:r>
-                        <a:rPr lang="en-US" dirty="0" err="1" smtClean="0"/>
+                        <a:rPr lang="en-US" b="0" dirty="0" err="1" smtClean="0"/>
                         <a:t>Cerveja</a:t>
                       </a:r>
                       <a:r>
-                        <a:rPr lang="en-US" dirty="0" smtClean="0"/>
+                        <a:rPr lang="en-US" b="0" dirty="0" smtClean="0"/>
                         <a:t> 1</a:t>
                       </a:r>
-                      <a:endParaRPr lang="pt-BR" dirty="0"/>
+                      <a:endParaRPr lang="pt-BR" b="0" dirty="0"/>
                     </a:p>
                   </a:txBody>
                   <a:tcPr anchor="ctr"/>
@@ -8551,6 +8881,32 @@
                   <a:tcPr anchor="ctr"/>
                 </a:tc>
               </a:tr>
+              <a:tr h="670439">
+                <a:tc>
+                  <a:txBody>
+                    <a:bodyPr/>
+                    <a:lstStyle/>
+                    <a:p>
+                      <a:r>
+                        <a:rPr lang="en-US" dirty="0" err="1" smtClean="0"/>
+                        <a:t>picanha</a:t>
+                      </a:r>
+                      <a:endParaRPr lang="pt-BR" dirty="0"/>
+                    </a:p>
+                  </a:txBody>
+                  <a:tcPr anchor="ctr"/>
+                </a:tc>
+                <a:tc>
+                  <a:txBody>
+                    <a:bodyPr/>
+                    <a:lstStyle/>
+                    <a:p>
+                      <a:endParaRPr lang="pt-BR" dirty="0"/>
+                    </a:p>
+                  </a:txBody>
+                  <a:tcPr anchor="ctr"/>
+                </a:tc>
+              </a:tr>
             </a:tbl>
           </a:graphicData>
         </a:graphic>
@@ -8563,7 +8919,7 @@
         </p:nvSpPr>
         <p:spPr>
           <a:xfrm>
-            <a:off x="6948264" y="836712"/>
+            <a:off x="7032672" y="836712"/>
             <a:ext cx="1368152" cy="369332"/>
           </a:xfrm>
           <a:prstGeom prst="rect">
@@ -8602,7 +8958,7 @@
         </p:nvSpPr>
         <p:spPr>
           <a:xfrm>
-            <a:off x="6948264" y="1412776"/>
+            <a:off x="7032672" y="1412776"/>
             <a:ext cx="1368152" cy="369332"/>
           </a:xfrm>
           <a:prstGeom prst="rect">
@@ -8641,7 +8997,7 @@
         </p:nvSpPr>
         <p:spPr>
           <a:xfrm>
-            <a:off x="6948264" y="1916832"/>
+            <a:off x="7032672" y="2016976"/>
             <a:ext cx="1368152" cy="369332"/>
           </a:xfrm>
           <a:prstGeom prst="rect">
@@ -8680,7 +9036,7 @@
         </p:nvSpPr>
         <p:spPr>
           <a:xfrm>
-            <a:off x="6948264" y="2564904"/>
+            <a:off x="7032672" y="2564904"/>
             <a:ext cx="1368152" cy="369332"/>
           </a:xfrm>
           <a:prstGeom prst="rect">
@@ -8719,7 +9075,46 @@
         </p:nvSpPr>
         <p:spPr>
           <a:xfrm>
-            <a:off x="6948264" y="3203684"/>
+            <a:off x="7032672" y="3203684"/>
+            <a:ext cx="1368152" cy="369332"/>
+          </a:xfrm>
+          <a:prstGeom prst="rect">
+            <a:avLst/>
+          </a:prstGeom>
+        </p:spPr>
+        <p:style>
+          <a:lnRef idx="2">
+            <a:schemeClr val="accent1"/>
+          </a:lnRef>
+          <a:fillRef idx="1">
+            <a:schemeClr val="lt1"/>
+          </a:fillRef>
+          <a:effectRef idx="0">
+            <a:schemeClr val="accent1"/>
+          </a:effectRef>
+          <a:fontRef idx="minor">
+            <a:schemeClr val="dk1"/>
+          </a:fontRef>
+        </p:style>
+        <p:txBody>
+          <a:bodyPr wrap="square" rtlCol="0">
+            <a:spAutoFit/>
+          </a:bodyPr>
+          <a:lstStyle/>
+          <a:p>
+            <a:endParaRPr lang="pt-BR" dirty="0"/>
+          </a:p>
+        </p:txBody>
+      </p:sp>
+      <p:sp>
+        <p:nvSpPr>
+          <p:cNvPr id="20" name="CaixaDeTexto 19"/>
+          <p:cNvSpPr txBox="1"/>
+          <p:nvPr/>
+        </p:nvSpPr>
+        <p:spPr>
+          <a:xfrm>
+            <a:off x="7032672" y="3861048"/>
             <a:ext cx="1368152" cy="369332"/>
           </a:xfrm>
           <a:prstGeom prst="rect">

</xml_diff>

<commit_message>
Gadgets for quantify the item list.
</commit_message>
<xml_diff>
--- a/ButecoCalc/Calculadora de Buteco - V2.0_rara.pptx
+++ b/ButecoCalc/Calculadora de Buteco - V2.0_rara.pptx
@@ -345,7 +345,7 @@
     </p:spTree>
     <p:extLst>
       <p:ext uri="{BB962C8B-B14F-4D97-AF65-F5344CB8AC3E}">
-        <p14:creationId xmlns="" xmlns:p14="http://schemas.microsoft.com/office/powerpoint/2010/main" val="215466170"/>
+        <p14:creationId xmlns:p14="http://schemas.microsoft.com/office/powerpoint/2010/main" xmlns="" val="215466170"/>
       </p:ext>
     </p:extLst>
   </p:cSld>
@@ -517,7 +517,7 @@
     </p:spTree>
     <p:extLst>
       <p:ext uri="{BB962C8B-B14F-4D97-AF65-F5344CB8AC3E}">
-        <p14:creationId xmlns="" xmlns:p14="http://schemas.microsoft.com/office/powerpoint/2010/main" val="1166872529"/>
+        <p14:creationId xmlns:p14="http://schemas.microsoft.com/office/powerpoint/2010/main" xmlns="" val="1166872529"/>
       </p:ext>
     </p:extLst>
   </p:cSld>
@@ -699,7 +699,7 @@
     </p:spTree>
     <p:extLst>
       <p:ext uri="{BB962C8B-B14F-4D97-AF65-F5344CB8AC3E}">
-        <p14:creationId xmlns="" xmlns:p14="http://schemas.microsoft.com/office/powerpoint/2010/main" val="3147579501"/>
+        <p14:creationId xmlns:p14="http://schemas.microsoft.com/office/powerpoint/2010/main" xmlns="" val="3147579501"/>
       </p:ext>
     </p:extLst>
   </p:cSld>
@@ -871,7 +871,7 @@
     </p:spTree>
     <p:extLst>
       <p:ext uri="{BB962C8B-B14F-4D97-AF65-F5344CB8AC3E}">
-        <p14:creationId xmlns="" xmlns:p14="http://schemas.microsoft.com/office/powerpoint/2010/main" val="3099147718"/>
+        <p14:creationId xmlns:p14="http://schemas.microsoft.com/office/powerpoint/2010/main" xmlns="" val="3099147718"/>
       </p:ext>
     </p:extLst>
   </p:cSld>
@@ -1119,7 +1119,7 @@
     </p:spTree>
     <p:extLst>
       <p:ext uri="{BB962C8B-B14F-4D97-AF65-F5344CB8AC3E}">
-        <p14:creationId xmlns="" xmlns:p14="http://schemas.microsoft.com/office/powerpoint/2010/main" val="315348413"/>
+        <p14:creationId xmlns:p14="http://schemas.microsoft.com/office/powerpoint/2010/main" xmlns="" val="315348413"/>
       </p:ext>
     </p:extLst>
   </p:cSld>
@@ -1409,7 +1409,7 @@
     </p:spTree>
     <p:extLst>
       <p:ext uri="{BB962C8B-B14F-4D97-AF65-F5344CB8AC3E}">
-        <p14:creationId xmlns="" xmlns:p14="http://schemas.microsoft.com/office/powerpoint/2010/main" val="2136048257"/>
+        <p14:creationId xmlns:p14="http://schemas.microsoft.com/office/powerpoint/2010/main" xmlns="" val="2136048257"/>
       </p:ext>
     </p:extLst>
   </p:cSld>
@@ -1833,7 +1833,7 @@
     </p:spTree>
     <p:extLst>
       <p:ext uri="{BB962C8B-B14F-4D97-AF65-F5344CB8AC3E}">
-        <p14:creationId xmlns="" xmlns:p14="http://schemas.microsoft.com/office/powerpoint/2010/main" val="572077057"/>
+        <p14:creationId xmlns:p14="http://schemas.microsoft.com/office/powerpoint/2010/main" xmlns="" val="572077057"/>
       </p:ext>
     </p:extLst>
   </p:cSld>
@@ -1953,7 +1953,7 @@
     </p:spTree>
     <p:extLst>
       <p:ext uri="{BB962C8B-B14F-4D97-AF65-F5344CB8AC3E}">
-        <p14:creationId xmlns="" xmlns:p14="http://schemas.microsoft.com/office/powerpoint/2010/main" val="2305895255"/>
+        <p14:creationId xmlns:p14="http://schemas.microsoft.com/office/powerpoint/2010/main" xmlns="" val="2305895255"/>
       </p:ext>
     </p:extLst>
   </p:cSld>
@@ -2050,7 +2050,7 @@
     </p:spTree>
     <p:extLst>
       <p:ext uri="{BB962C8B-B14F-4D97-AF65-F5344CB8AC3E}">
-        <p14:creationId xmlns="" xmlns:p14="http://schemas.microsoft.com/office/powerpoint/2010/main" val="979589043"/>
+        <p14:creationId xmlns:p14="http://schemas.microsoft.com/office/powerpoint/2010/main" xmlns="" val="979589043"/>
       </p:ext>
     </p:extLst>
   </p:cSld>
@@ -2329,7 +2329,7 @@
     </p:spTree>
     <p:extLst>
       <p:ext uri="{BB962C8B-B14F-4D97-AF65-F5344CB8AC3E}">
-        <p14:creationId xmlns="" xmlns:p14="http://schemas.microsoft.com/office/powerpoint/2010/main" val="1735525890"/>
+        <p14:creationId xmlns:p14="http://schemas.microsoft.com/office/powerpoint/2010/main" xmlns="" val="1735525890"/>
       </p:ext>
     </p:extLst>
   </p:cSld>
@@ -2584,7 +2584,7 @@
     </p:spTree>
     <p:extLst>
       <p:ext uri="{BB962C8B-B14F-4D97-AF65-F5344CB8AC3E}">
-        <p14:creationId xmlns="" xmlns:p14="http://schemas.microsoft.com/office/powerpoint/2010/main" val="1848032959"/>
+        <p14:creationId xmlns:p14="http://schemas.microsoft.com/office/powerpoint/2010/main" xmlns="" val="1848032959"/>
       </p:ext>
     </p:extLst>
   </p:cSld>
@@ -2835,7 +2835,7 @@
     </p:spTree>
     <p:extLst>
       <p:ext uri="{BB962C8B-B14F-4D97-AF65-F5344CB8AC3E}">
-        <p14:creationId xmlns="" xmlns:p14="http://schemas.microsoft.com/office/powerpoint/2010/main" val="4005526220"/>
+        <p14:creationId xmlns:p14="http://schemas.microsoft.com/office/powerpoint/2010/main" xmlns="" val="4005526220"/>
       </p:ext>
     </p:extLst>
   </p:cSld>
@@ -3285,7 +3285,7 @@
           <p:nvPr>
             <p:extLst>
               <p:ext uri="{D42A27DB-BD31-4B8C-83A1-F6EECF244321}">
-                <p14:modId xmlns="" xmlns:p14="http://schemas.microsoft.com/office/powerpoint/2010/main" val="3886045665"/>
+                <p14:modId xmlns:p14="http://schemas.microsoft.com/office/powerpoint/2010/main" xmlns="" val="3886045665"/>
               </p:ext>
             </p:extLst>
           </p:nvPr>
@@ -3694,7 +3694,7 @@
           <p:nvPr>
             <p:extLst>
               <p:ext uri="{D42A27DB-BD31-4B8C-83A1-F6EECF244321}">
-                <p14:modId xmlns="" xmlns:p14="http://schemas.microsoft.com/office/powerpoint/2010/main" val="746775931"/>
+                <p14:modId xmlns:p14="http://schemas.microsoft.com/office/powerpoint/2010/main" xmlns="" val="746775931"/>
               </p:ext>
             </p:extLst>
           </p:nvPr>
@@ -3751,7 +3751,7 @@
           <a:blip r:embed="rId3" cstate="print">
             <a:extLst>
               <a:ext uri="{28A0092B-C50C-407E-A947-70E740481C1C}">
-                <a14:useLocalDpi xmlns="" xmlns:a14="http://schemas.microsoft.com/office/drawing/2010/main" val="0"/>
+                <a14:useLocalDpi xmlns:a14="http://schemas.microsoft.com/office/drawing/2010/main" xmlns="" val="0"/>
               </a:ext>
             </a:extLst>
           </a:blip>
@@ -3781,7 +3781,7 @@
           <a:blip r:embed="rId4" cstate="print">
             <a:extLst>
               <a:ext uri="{28A0092B-C50C-407E-A947-70E740481C1C}">
-                <a14:useLocalDpi xmlns="" xmlns:a14="http://schemas.microsoft.com/office/drawing/2010/main" val="0"/>
+                <a14:useLocalDpi xmlns:a14="http://schemas.microsoft.com/office/drawing/2010/main" xmlns="" val="0"/>
               </a:ext>
             </a:extLst>
           </a:blip>
@@ -3811,7 +3811,7 @@
           <a:blip r:embed="rId5" cstate="print">
             <a:extLst>
               <a:ext uri="{28A0092B-C50C-407E-A947-70E740481C1C}">
-                <a14:useLocalDpi xmlns="" xmlns:a14="http://schemas.microsoft.com/office/drawing/2010/main" val="0"/>
+                <a14:useLocalDpi xmlns:a14="http://schemas.microsoft.com/office/drawing/2010/main" xmlns="" val="0"/>
               </a:ext>
             </a:extLst>
           </a:blip>
@@ -3841,7 +3841,7 @@
           <a:blip r:embed="rId5" cstate="print">
             <a:extLst>
               <a:ext uri="{28A0092B-C50C-407E-A947-70E740481C1C}">
-                <a14:useLocalDpi xmlns="" xmlns:a14="http://schemas.microsoft.com/office/drawing/2010/main" val="0"/>
+                <a14:useLocalDpi xmlns:a14="http://schemas.microsoft.com/office/drawing/2010/main" xmlns="" val="0"/>
               </a:ext>
             </a:extLst>
           </a:blip>
@@ -3986,7 +3986,7 @@
     </p:spTree>
     <p:extLst>
       <p:ext uri="{BB962C8B-B14F-4D97-AF65-F5344CB8AC3E}">
-        <p14:creationId xmlns="" xmlns:p14="http://schemas.microsoft.com/office/powerpoint/2010/main" val="644109181"/>
+        <p14:creationId xmlns:p14="http://schemas.microsoft.com/office/powerpoint/2010/main" xmlns="" val="644109181"/>
       </p:ext>
     </p:extLst>
   </p:cSld>
@@ -4175,7 +4175,7 @@
           <p:nvPr>
             <p:extLst>
               <p:ext uri="{D42A27DB-BD31-4B8C-83A1-F6EECF244321}">
-                <p14:modId xmlns="" xmlns:p14="http://schemas.microsoft.com/office/powerpoint/2010/main" val="3886045665"/>
+                <p14:modId xmlns:p14="http://schemas.microsoft.com/office/powerpoint/2010/main" xmlns="" val="3886045665"/>
               </p:ext>
             </p:extLst>
           </p:nvPr>
@@ -4672,7 +4672,7 @@
         <p:spPr>
           <a:xfrm>
             <a:off x="5004048" y="5877272"/>
-            <a:ext cx="3996000" cy="824175"/>
+            <a:ext cx="2952328" cy="824175"/>
           </a:xfrm>
           <a:prstGeom prst="rect">
             <a:avLst/>
@@ -4689,10 +4689,210 @@
           </a:effectLst>
         </p:spPr>
       </p:pic>
+      <p:sp>
+        <p:nvSpPr>
+          <p:cNvPr id="7" name="CaixaDeTexto 6"/>
+          <p:cNvSpPr txBox="1"/>
+          <p:nvPr/>
+        </p:nvSpPr>
+        <p:spPr>
+          <a:xfrm>
+            <a:off x="8028384" y="5877271"/>
+            <a:ext cx="936104" cy="824400"/>
+          </a:xfrm>
+          <a:prstGeom prst="rect">
+            <a:avLst/>
+          </a:prstGeom>
+        </p:spPr>
+        <p:style>
+          <a:lnRef idx="1">
+            <a:schemeClr val="accent1"/>
+          </a:lnRef>
+          <a:fillRef idx="3">
+            <a:schemeClr val="accent1"/>
+          </a:fillRef>
+          <a:effectRef idx="2">
+            <a:schemeClr val="accent1"/>
+          </a:effectRef>
+          <a:fontRef idx="minor">
+            <a:schemeClr val="lt1"/>
+          </a:fontRef>
+        </p:style>
+        <p:txBody>
+          <a:bodyPr wrap="square" rtlCol="0" anchor="ctr">
+            <a:spAutoFit/>
+          </a:bodyPr>
+          <a:lstStyle/>
+          <a:p>
+            <a:pPr algn="ctr"/>
+            <a:r>
+              <a:rPr lang="en-US" sz="4400" b="1" dirty="0" smtClean="0">
+                <a:solidFill>
+                  <a:schemeClr val="bg1"/>
+                </a:solidFill>
+                <a:effectLst>
+                  <a:outerShdw blurRad="38100" dist="38100" dir="2700000" algn="tl">
+                    <a:srgbClr val="000000">
+                      <a:alpha val="43137"/>
+                    </a:srgbClr>
+                  </a:outerShdw>
+                </a:effectLst>
+                <a:latin typeface="OpenSymbol"/>
+                <a:ea typeface="OpenSymbol"/>
+              </a:rPr>
+              <a:t>✓</a:t>
+            </a:r>
+            <a:endParaRPr lang="pt-BR" sz="4400" b="1" dirty="0">
+              <a:solidFill>
+                <a:schemeClr val="bg1"/>
+              </a:solidFill>
+              <a:effectLst>
+                <a:outerShdw blurRad="38100" dist="38100" dir="2700000" algn="tl">
+                  <a:srgbClr val="000000">
+                    <a:alpha val="43137"/>
+                  </a:srgbClr>
+                </a:outerShdw>
+              </a:effectLst>
+            </a:endParaRPr>
+          </a:p>
+        </p:txBody>
+      </p:sp>
+      <p:sp>
+        <p:nvSpPr>
+          <p:cNvPr id="9" name="Elipse 8"/>
+          <p:cNvSpPr/>
+          <p:nvPr/>
+        </p:nvSpPr>
+        <p:spPr>
+          <a:xfrm>
+            <a:off x="5436096" y="5445224"/>
+            <a:ext cx="504056" cy="432048"/>
+          </a:xfrm>
+          <a:prstGeom prst="ellipse">
+            <a:avLst/>
+          </a:prstGeom>
+        </p:spPr>
+        <p:style>
+          <a:lnRef idx="2">
+            <a:schemeClr val="accent1">
+              <a:shade val="50000"/>
+            </a:schemeClr>
+          </a:lnRef>
+          <a:fillRef idx="1">
+            <a:schemeClr val="accent1"/>
+          </a:fillRef>
+          <a:effectRef idx="0">
+            <a:schemeClr val="accent1"/>
+          </a:effectRef>
+          <a:fontRef idx="minor">
+            <a:schemeClr val="lt1"/>
+          </a:fontRef>
+        </p:style>
+        <p:txBody>
+          <a:bodyPr rtlCol="0" anchor="ctr"/>
+          <a:lstStyle/>
+          <a:p>
+            <a:pPr algn="ctr"/>
+            <a:r>
+              <a:rPr lang="en-US" dirty="0" smtClean="0"/>
+              <a:t>1</a:t>
+            </a:r>
+            <a:endParaRPr lang="pt-BR" dirty="0"/>
+          </a:p>
+        </p:txBody>
+      </p:sp>
+      <p:sp>
+        <p:nvSpPr>
+          <p:cNvPr id="10" name="Elipse 9"/>
+          <p:cNvSpPr/>
+          <p:nvPr/>
+        </p:nvSpPr>
+        <p:spPr>
+          <a:xfrm>
+            <a:off x="6876256" y="5445224"/>
+            <a:ext cx="504056" cy="432048"/>
+          </a:xfrm>
+          <a:prstGeom prst="ellipse">
+            <a:avLst/>
+          </a:prstGeom>
+        </p:spPr>
+        <p:style>
+          <a:lnRef idx="2">
+            <a:schemeClr val="accent3">
+              <a:shade val="50000"/>
+            </a:schemeClr>
+          </a:lnRef>
+          <a:fillRef idx="1">
+            <a:schemeClr val="accent3"/>
+          </a:fillRef>
+          <a:effectRef idx="0">
+            <a:schemeClr val="accent3"/>
+          </a:effectRef>
+          <a:fontRef idx="minor">
+            <a:schemeClr val="lt1"/>
+          </a:fontRef>
+        </p:style>
+        <p:txBody>
+          <a:bodyPr rtlCol="0" anchor="ctr"/>
+          <a:lstStyle/>
+          <a:p>
+            <a:pPr algn="ctr"/>
+            <a:r>
+              <a:rPr lang="en-US" dirty="0" smtClean="0"/>
+              <a:t>2</a:t>
+            </a:r>
+            <a:endParaRPr lang="pt-BR" dirty="0"/>
+          </a:p>
+        </p:txBody>
+      </p:sp>
+      <p:sp>
+        <p:nvSpPr>
+          <p:cNvPr id="11" name="Elipse 10"/>
+          <p:cNvSpPr/>
+          <p:nvPr/>
+        </p:nvSpPr>
+        <p:spPr>
+          <a:xfrm>
+            <a:off x="8244408" y="5445224"/>
+            <a:ext cx="504056" cy="432048"/>
+          </a:xfrm>
+          <a:prstGeom prst="ellipse">
+            <a:avLst/>
+          </a:prstGeom>
+        </p:spPr>
+        <p:style>
+          <a:lnRef idx="2">
+            <a:schemeClr val="accent4">
+              <a:shade val="50000"/>
+            </a:schemeClr>
+          </a:lnRef>
+          <a:fillRef idx="1">
+            <a:schemeClr val="accent4"/>
+          </a:fillRef>
+          <a:effectRef idx="0">
+            <a:schemeClr val="accent4"/>
+          </a:effectRef>
+          <a:fontRef idx="minor">
+            <a:schemeClr val="lt1"/>
+          </a:fontRef>
+        </p:style>
+        <p:txBody>
+          <a:bodyPr rtlCol="0" anchor="ctr"/>
+          <a:lstStyle/>
+          <a:p>
+            <a:pPr algn="ctr"/>
+            <a:r>
+              <a:rPr lang="en-US" dirty="0" smtClean="0"/>
+              <a:t>3</a:t>
+            </a:r>
+            <a:endParaRPr lang="pt-BR" dirty="0"/>
+          </a:p>
+        </p:txBody>
+      </p:sp>
     </p:spTree>
     <p:extLst>
       <p:ext uri="{BB962C8B-B14F-4D97-AF65-F5344CB8AC3E}">
-        <p14:creationId xmlns="" xmlns:p14="http://schemas.microsoft.com/office/powerpoint/2010/main" val="644109181"/>
+        <p14:creationId xmlns:p14="http://schemas.microsoft.com/office/powerpoint/2010/main" xmlns="" val="644109181"/>
       </p:ext>
     </p:extLst>
   </p:cSld>
@@ -4797,7 +4997,7 @@
           <p:nvPr>
             <p:extLst>
               <p:ext uri="{D42A27DB-BD31-4B8C-83A1-F6EECF244321}">
-                <p14:modId xmlns="" xmlns:p14="http://schemas.microsoft.com/office/powerpoint/2010/main" val="3886045665"/>
+                <p14:modId xmlns:p14="http://schemas.microsoft.com/office/powerpoint/2010/main" xmlns="" val="3886045665"/>
               </p:ext>
             </p:extLst>
           </p:nvPr>
@@ -6325,10 +6525,54 @@
           </a:prstGeom>
         </p:spPr>
       </p:pic>
+      <p:sp>
+        <p:nvSpPr>
+          <p:cNvPr id="27" name="Elipse 26"/>
+          <p:cNvSpPr/>
+          <p:nvPr/>
+        </p:nvSpPr>
+        <p:spPr>
+          <a:xfrm>
+            <a:off x="2627784" y="260648"/>
+            <a:ext cx="504056" cy="432048"/>
+          </a:xfrm>
+          <a:prstGeom prst="ellipse">
+            <a:avLst/>
+          </a:prstGeom>
+        </p:spPr>
+        <p:style>
+          <a:lnRef idx="2">
+            <a:schemeClr val="accent1">
+              <a:shade val="50000"/>
+            </a:schemeClr>
+          </a:lnRef>
+          <a:fillRef idx="1">
+            <a:schemeClr val="accent1"/>
+          </a:fillRef>
+          <a:effectRef idx="0">
+            <a:schemeClr val="accent1"/>
+          </a:effectRef>
+          <a:fontRef idx="minor">
+            <a:schemeClr val="lt1"/>
+          </a:fontRef>
+        </p:style>
+        <p:txBody>
+          <a:bodyPr rtlCol="0" anchor="ctr"/>
+          <a:lstStyle/>
+          <a:p>
+            <a:pPr algn="ctr"/>
+            <a:r>
+              <a:rPr lang="en-US" dirty="0" smtClean="0"/>
+              <a:t>1</a:t>
+            </a:r>
+            <a:endParaRPr lang="pt-BR" dirty="0"/>
+          </a:p>
+        </p:txBody>
+      </p:sp>
     </p:spTree>
     <p:extLst>
       <p:ext uri="{BB962C8B-B14F-4D97-AF65-F5344CB8AC3E}">
-        <p14:creationId xmlns="" xmlns:p14="http://schemas.microsoft.com/office/powerpoint/2010/main" val="644109181"/>
+        <p14:creationId xmlns:p14="http://schemas.microsoft.com/office/powerpoint/2010/main" xmlns="" val="644109181"/>
       </p:ext>
     </p:extLst>
   </p:cSld>
@@ -6438,7 +6682,7 @@
           <p:nvPr>
             <p:extLst>
               <p:ext uri="{D42A27DB-BD31-4B8C-83A1-F6EECF244321}">
-                <p14:modId xmlns="" xmlns:p14="http://schemas.microsoft.com/office/powerpoint/2010/main" val="3886045665"/>
+                <p14:modId xmlns:p14="http://schemas.microsoft.com/office/powerpoint/2010/main" xmlns="" val="3886045665"/>
               </p:ext>
             </p:extLst>
           </p:nvPr>
@@ -7792,10 +8036,54 @@
           </a:p>
         </p:txBody>
       </p:sp>
+      <p:sp>
+        <p:nvSpPr>
+          <p:cNvPr id="29" name="Elipse 28"/>
+          <p:cNvSpPr/>
+          <p:nvPr/>
+        </p:nvSpPr>
+        <p:spPr>
+          <a:xfrm>
+            <a:off x="2987824" y="260648"/>
+            <a:ext cx="504056" cy="432048"/>
+          </a:xfrm>
+          <a:prstGeom prst="ellipse">
+            <a:avLst/>
+          </a:prstGeom>
+        </p:spPr>
+        <p:style>
+          <a:lnRef idx="2">
+            <a:schemeClr val="accent3">
+              <a:shade val="50000"/>
+            </a:schemeClr>
+          </a:lnRef>
+          <a:fillRef idx="1">
+            <a:schemeClr val="accent3"/>
+          </a:fillRef>
+          <a:effectRef idx="0">
+            <a:schemeClr val="accent3"/>
+          </a:effectRef>
+          <a:fontRef idx="minor">
+            <a:schemeClr val="lt1"/>
+          </a:fontRef>
+        </p:style>
+        <p:txBody>
+          <a:bodyPr rtlCol="0" anchor="ctr"/>
+          <a:lstStyle/>
+          <a:p>
+            <a:pPr algn="ctr"/>
+            <a:r>
+              <a:rPr lang="en-US" dirty="0" smtClean="0"/>
+              <a:t>2</a:t>
+            </a:r>
+            <a:endParaRPr lang="pt-BR" dirty="0"/>
+          </a:p>
+        </p:txBody>
+      </p:sp>
     </p:spTree>
     <p:extLst>
       <p:ext uri="{BB962C8B-B14F-4D97-AF65-F5344CB8AC3E}">
-        <p14:creationId xmlns="" xmlns:p14="http://schemas.microsoft.com/office/powerpoint/2010/main" val="644109181"/>
+        <p14:creationId xmlns:p14="http://schemas.microsoft.com/office/powerpoint/2010/main" xmlns="" val="644109181"/>
       </p:ext>
     </p:extLst>
   </p:cSld>
@@ -7916,7 +8204,7 @@
           <p:nvPr>
             <p:extLst>
               <p:ext uri="{D42A27DB-BD31-4B8C-83A1-F6EECF244321}">
-                <p14:modId xmlns="" xmlns:p14="http://schemas.microsoft.com/office/powerpoint/2010/main" val="3886045665"/>
+                <p14:modId xmlns:p14="http://schemas.microsoft.com/office/powerpoint/2010/main" xmlns="" val="3886045665"/>
               </p:ext>
             </p:extLst>
           </p:nvPr>
@@ -8913,242 +9201,532 @@
       </p:graphicFrame>
       <p:sp>
         <p:nvSpPr>
-          <p:cNvPr id="10" name="CaixaDeTexto 9"/>
-          <p:cNvSpPr txBox="1"/>
+          <p:cNvPr id="27" name="Elipse 26"/>
+          <p:cNvSpPr/>
           <p:nvPr/>
         </p:nvSpPr>
         <p:spPr>
           <a:xfrm>
-            <a:off x="7032672" y="836712"/>
-            <a:ext cx="1368152" cy="369332"/>
+            <a:off x="3419872" y="260648"/>
+            <a:ext cx="504056" cy="432048"/>
           </a:xfrm>
-          <a:prstGeom prst="rect">
+          <a:prstGeom prst="ellipse">
             <a:avLst/>
           </a:prstGeom>
         </p:spPr>
         <p:style>
           <a:lnRef idx="2">
-            <a:schemeClr val="accent1"/>
+            <a:schemeClr val="accent4">
+              <a:shade val="50000"/>
+            </a:schemeClr>
           </a:lnRef>
           <a:fillRef idx="1">
-            <a:schemeClr val="lt1"/>
+            <a:schemeClr val="accent4"/>
           </a:fillRef>
           <a:effectRef idx="0">
-            <a:schemeClr val="accent1"/>
+            <a:schemeClr val="accent4"/>
           </a:effectRef>
           <a:fontRef idx="minor">
-            <a:schemeClr val="dk1"/>
+            <a:schemeClr val="lt1"/>
           </a:fontRef>
         </p:style>
+        <p:txBody>
+          <a:bodyPr rtlCol="0" anchor="ctr"/>
+          <a:lstStyle/>
+          <a:p>
+            <a:pPr algn="ctr"/>
+            <a:r>
+              <a:rPr lang="en-US" dirty="0" smtClean="0"/>
+              <a:t>3</a:t>
+            </a:r>
+            <a:endParaRPr lang="pt-BR" dirty="0"/>
+          </a:p>
+        </p:txBody>
+      </p:sp>
+      <p:pic>
+        <p:nvPicPr>
+          <p:cNvPr id="28" name="Imagem 27" descr="qtd.png"/>
+          <p:cNvPicPr>
+            <a:picLocks noChangeAspect="1"/>
+          </p:cNvPicPr>
+          <p:nvPr/>
+        </p:nvPicPr>
+        <p:blipFill>
+          <a:blip r:embed="rId4" cstate="print"/>
+          <a:stretch>
+            <a:fillRect/>
+          </a:stretch>
+        </p:blipFill>
+        <p:spPr>
+          <a:xfrm>
+            <a:off x="7010410" y="873208"/>
+            <a:ext cx="1515062" cy="322774"/>
+          </a:xfrm>
+          <a:prstGeom prst="rect">
+            <a:avLst/>
+          </a:prstGeom>
+          <a:ln>
+            <a:noFill/>
+          </a:ln>
+          <a:effectLst>
+            <a:outerShdw blurRad="292100" dist="139700" dir="2700000" algn="tl" rotWithShape="0">
+              <a:srgbClr val="333333">
+                <a:alpha val="65000"/>
+              </a:srgbClr>
+            </a:outerShdw>
+          </a:effectLst>
+        </p:spPr>
+      </p:pic>
+      <p:pic>
+        <p:nvPicPr>
+          <p:cNvPr id="29" name="Imagem 28" descr="qtd.png"/>
+          <p:cNvPicPr>
+            <a:picLocks noChangeAspect="1"/>
+          </p:cNvPicPr>
+          <p:nvPr/>
+        </p:nvPicPr>
+        <p:blipFill>
+          <a:blip r:embed="rId4" cstate="print"/>
+          <a:stretch>
+            <a:fillRect/>
+          </a:stretch>
+        </p:blipFill>
+        <p:spPr>
+          <a:xfrm>
+            <a:off x="7020272" y="1412776"/>
+            <a:ext cx="1515062" cy="322774"/>
+          </a:xfrm>
+          <a:prstGeom prst="rect">
+            <a:avLst/>
+          </a:prstGeom>
+          <a:ln>
+            <a:noFill/>
+          </a:ln>
+          <a:effectLst>
+            <a:outerShdw blurRad="292100" dist="139700" dir="2700000" algn="tl" rotWithShape="0">
+              <a:srgbClr val="333333">
+                <a:alpha val="65000"/>
+              </a:srgbClr>
+            </a:outerShdw>
+          </a:effectLst>
+        </p:spPr>
+      </p:pic>
+      <p:pic>
+        <p:nvPicPr>
+          <p:cNvPr id="30" name="Imagem 29" descr="qtd.png"/>
+          <p:cNvPicPr>
+            <a:picLocks noChangeAspect="1"/>
+          </p:cNvPicPr>
+          <p:nvPr/>
+        </p:nvPicPr>
+        <p:blipFill>
+          <a:blip r:embed="rId4" cstate="print"/>
+          <a:stretch>
+            <a:fillRect/>
+          </a:stretch>
+        </p:blipFill>
+        <p:spPr>
+          <a:xfrm>
+            <a:off x="7020272" y="2060848"/>
+            <a:ext cx="1515062" cy="322774"/>
+          </a:xfrm>
+          <a:prstGeom prst="rect">
+            <a:avLst/>
+          </a:prstGeom>
+          <a:ln>
+            <a:noFill/>
+          </a:ln>
+          <a:effectLst>
+            <a:outerShdw blurRad="292100" dist="139700" dir="2700000" algn="tl" rotWithShape="0">
+              <a:srgbClr val="333333">
+                <a:alpha val="65000"/>
+              </a:srgbClr>
+            </a:outerShdw>
+          </a:effectLst>
+        </p:spPr>
+      </p:pic>
+      <p:pic>
+        <p:nvPicPr>
+          <p:cNvPr id="31" name="Imagem 30" descr="qtd.png"/>
+          <p:cNvPicPr>
+            <a:picLocks noChangeAspect="1"/>
+          </p:cNvPicPr>
+          <p:nvPr/>
+        </p:nvPicPr>
+        <p:blipFill>
+          <a:blip r:embed="rId4" cstate="print"/>
+          <a:stretch>
+            <a:fillRect/>
+          </a:stretch>
+        </p:blipFill>
+        <p:spPr>
+          <a:xfrm>
+            <a:off x="7030134" y="2600416"/>
+            <a:ext cx="1515062" cy="322774"/>
+          </a:xfrm>
+          <a:prstGeom prst="rect">
+            <a:avLst/>
+          </a:prstGeom>
+          <a:ln>
+            <a:noFill/>
+          </a:ln>
+          <a:effectLst>
+            <a:outerShdw blurRad="292100" dist="139700" dir="2700000" algn="tl" rotWithShape="0">
+              <a:srgbClr val="333333">
+                <a:alpha val="65000"/>
+              </a:srgbClr>
+            </a:outerShdw>
+          </a:effectLst>
+        </p:spPr>
+      </p:pic>
+      <p:pic>
+        <p:nvPicPr>
+          <p:cNvPr id="32" name="Imagem 31" descr="qtd.png"/>
+          <p:cNvPicPr>
+            <a:picLocks noChangeAspect="1"/>
+          </p:cNvPicPr>
+          <p:nvPr/>
+        </p:nvPicPr>
+        <p:blipFill>
+          <a:blip r:embed="rId4" cstate="print"/>
+          <a:stretch>
+            <a:fillRect/>
+          </a:stretch>
+        </p:blipFill>
+        <p:spPr>
+          <a:xfrm>
+            <a:off x="7010410" y="3249472"/>
+            <a:ext cx="1515062" cy="322774"/>
+          </a:xfrm>
+          <a:prstGeom prst="rect">
+            <a:avLst/>
+          </a:prstGeom>
+          <a:ln>
+            <a:noFill/>
+          </a:ln>
+          <a:effectLst>
+            <a:outerShdw blurRad="292100" dist="139700" dir="2700000" algn="tl" rotWithShape="0">
+              <a:srgbClr val="333333">
+                <a:alpha val="65000"/>
+              </a:srgbClr>
+            </a:outerShdw>
+          </a:effectLst>
+        </p:spPr>
+      </p:pic>
+      <p:pic>
+        <p:nvPicPr>
+          <p:cNvPr id="33" name="Imagem 32" descr="qtd.png"/>
+          <p:cNvPicPr>
+            <a:picLocks noChangeAspect="1"/>
+          </p:cNvPicPr>
+          <p:nvPr/>
+        </p:nvPicPr>
+        <p:blipFill>
+          <a:blip r:embed="rId4" cstate="print"/>
+          <a:stretch>
+            <a:fillRect/>
+          </a:stretch>
+        </p:blipFill>
+        <p:spPr>
+          <a:xfrm>
+            <a:off x="7020272" y="3887682"/>
+            <a:ext cx="1515062" cy="322774"/>
+          </a:xfrm>
+          <a:prstGeom prst="rect">
+            <a:avLst/>
+          </a:prstGeom>
+          <a:ln>
+            <a:noFill/>
+          </a:ln>
+          <a:effectLst>
+            <a:outerShdw blurRad="292100" dist="139700" dir="2700000" algn="tl" rotWithShape="0">
+              <a:srgbClr val="333333">
+                <a:alpha val="65000"/>
+              </a:srgbClr>
+            </a:outerShdw>
+          </a:effectLst>
+        </p:spPr>
+      </p:pic>
+      <p:sp>
+        <p:nvSpPr>
+          <p:cNvPr id="34" name="CaixaDeTexto 33"/>
+          <p:cNvSpPr txBox="1"/>
+          <p:nvPr/>
+        </p:nvSpPr>
+        <p:spPr>
+          <a:xfrm>
+            <a:off x="7596336" y="836712"/>
+            <a:ext cx="432048" cy="369332"/>
+          </a:xfrm>
+          <a:prstGeom prst="rect">
+            <a:avLst/>
+          </a:prstGeom>
+          <a:noFill/>
+        </p:spPr>
         <p:txBody>
           <a:bodyPr wrap="square" rtlCol="0">
             <a:spAutoFit/>
           </a:bodyPr>
           <a:lstStyle/>
           <a:p>
-            <a:endParaRPr lang="pt-BR" dirty="0"/>
-          </a:p>
-        </p:txBody>
-      </p:sp>
-      <p:sp>
-        <p:nvSpPr>
-          <p:cNvPr id="23" name="CaixaDeTexto 22"/>
+            <a:r>
+              <a:rPr lang="en-US" b="1" dirty="0" smtClean="0">
+                <a:effectLst>
+                  <a:outerShdw blurRad="38100" dist="38100" dir="2700000" algn="tl">
+                    <a:srgbClr val="000000">
+                      <a:alpha val="43137"/>
+                    </a:srgbClr>
+                  </a:outerShdw>
+                </a:effectLst>
+              </a:rPr>
+              <a:t>7</a:t>
+            </a:r>
+            <a:endParaRPr lang="pt-BR" b="1" dirty="0">
+              <a:effectLst>
+                <a:outerShdw blurRad="38100" dist="38100" dir="2700000" algn="tl">
+                  <a:srgbClr val="000000">
+                    <a:alpha val="43137"/>
+                  </a:srgbClr>
+                </a:outerShdw>
+              </a:effectLst>
+            </a:endParaRPr>
+          </a:p>
+        </p:txBody>
+      </p:sp>
+      <p:sp>
+        <p:nvSpPr>
+          <p:cNvPr id="35" name="CaixaDeTexto 34"/>
           <p:cNvSpPr txBox="1"/>
           <p:nvPr/>
         </p:nvSpPr>
         <p:spPr>
           <a:xfrm>
-            <a:off x="7032672" y="1412776"/>
-            <a:ext cx="1368152" cy="369332"/>
+            <a:off x="7604230" y="1377264"/>
+            <a:ext cx="432048" cy="369332"/>
           </a:xfrm>
           <a:prstGeom prst="rect">
             <a:avLst/>
           </a:prstGeom>
+          <a:noFill/>
         </p:spPr>
-        <p:style>
-          <a:lnRef idx="2">
-            <a:schemeClr val="accent1"/>
-          </a:lnRef>
-          <a:fillRef idx="1">
-            <a:schemeClr val="lt1"/>
-          </a:fillRef>
-          <a:effectRef idx="0">
-            <a:schemeClr val="accent1"/>
-          </a:effectRef>
-          <a:fontRef idx="minor">
-            <a:schemeClr val="dk1"/>
-          </a:fontRef>
-        </p:style>
         <p:txBody>
           <a:bodyPr wrap="square" rtlCol="0">
             <a:spAutoFit/>
           </a:bodyPr>
           <a:lstStyle/>
           <a:p>
-            <a:endParaRPr lang="pt-BR" dirty="0"/>
-          </a:p>
-        </p:txBody>
-      </p:sp>
-      <p:sp>
-        <p:nvSpPr>
-          <p:cNvPr id="24" name="CaixaDeTexto 23"/>
+            <a:r>
+              <a:rPr lang="en-US" b="1" dirty="0" smtClean="0">
+                <a:effectLst>
+                  <a:outerShdw blurRad="38100" dist="38100" dir="2700000" algn="tl">
+                    <a:srgbClr val="000000">
+                      <a:alpha val="43137"/>
+                    </a:srgbClr>
+                  </a:outerShdw>
+                </a:effectLst>
+              </a:rPr>
+              <a:t>3</a:t>
+            </a:r>
+            <a:endParaRPr lang="pt-BR" b="1" dirty="0">
+              <a:effectLst>
+                <a:outerShdw blurRad="38100" dist="38100" dir="2700000" algn="tl">
+                  <a:srgbClr val="000000">
+                    <a:alpha val="43137"/>
+                  </a:srgbClr>
+                </a:outerShdw>
+              </a:effectLst>
+            </a:endParaRPr>
+          </a:p>
+        </p:txBody>
+      </p:sp>
+      <p:sp>
+        <p:nvSpPr>
+          <p:cNvPr id="36" name="CaixaDeTexto 35"/>
           <p:cNvSpPr txBox="1"/>
           <p:nvPr/>
         </p:nvSpPr>
         <p:spPr>
           <a:xfrm>
-            <a:off x="7032672" y="2016976"/>
-            <a:ext cx="1368152" cy="369332"/>
+            <a:off x="7596336" y="2060848"/>
+            <a:ext cx="432048" cy="369332"/>
           </a:xfrm>
           <a:prstGeom prst="rect">
             <a:avLst/>
           </a:prstGeom>
+          <a:noFill/>
         </p:spPr>
-        <p:style>
-          <a:lnRef idx="2">
-            <a:schemeClr val="accent1"/>
-          </a:lnRef>
-          <a:fillRef idx="1">
-            <a:schemeClr val="lt1"/>
-          </a:fillRef>
-          <a:effectRef idx="0">
-            <a:schemeClr val="accent1"/>
-          </a:effectRef>
-          <a:fontRef idx="minor">
-            <a:schemeClr val="dk1"/>
-          </a:fontRef>
-        </p:style>
         <p:txBody>
           <a:bodyPr wrap="square" rtlCol="0">
             <a:spAutoFit/>
           </a:bodyPr>
           <a:lstStyle/>
           <a:p>
-            <a:endParaRPr lang="pt-BR" dirty="0"/>
-          </a:p>
-        </p:txBody>
-      </p:sp>
-      <p:sp>
-        <p:nvSpPr>
-          <p:cNvPr id="25" name="CaixaDeTexto 24"/>
+            <a:r>
+              <a:rPr lang="en-US" b="1" dirty="0" smtClean="0">
+                <a:effectLst>
+                  <a:outerShdw blurRad="38100" dist="38100" dir="2700000" algn="tl">
+                    <a:srgbClr val="000000">
+                      <a:alpha val="43137"/>
+                    </a:srgbClr>
+                  </a:outerShdw>
+                </a:effectLst>
+              </a:rPr>
+              <a:t>1</a:t>
+            </a:r>
+            <a:endParaRPr lang="pt-BR" b="1" dirty="0">
+              <a:effectLst>
+                <a:outerShdw blurRad="38100" dist="38100" dir="2700000" algn="tl">
+                  <a:srgbClr val="000000">
+                    <a:alpha val="43137"/>
+                  </a:srgbClr>
+                </a:outerShdw>
+              </a:effectLst>
+            </a:endParaRPr>
+          </a:p>
+        </p:txBody>
+      </p:sp>
+      <p:sp>
+        <p:nvSpPr>
+          <p:cNvPr id="37" name="CaixaDeTexto 36"/>
           <p:cNvSpPr txBox="1"/>
           <p:nvPr/>
         </p:nvSpPr>
         <p:spPr>
           <a:xfrm>
-            <a:off x="7032672" y="2564904"/>
-            <a:ext cx="1368152" cy="369332"/>
+            <a:off x="7604230" y="2601400"/>
+            <a:ext cx="432048" cy="369332"/>
           </a:xfrm>
           <a:prstGeom prst="rect">
             <a:avLst/>
           </a:prstGeom>
+          <a:noFill/>
         </p:spPr>
-        <p:style>
-          <a:lnRef idx="2">
-            <a:schemeClr val="accent1"/>
-          </a:lnRef>
-          <a:fillRef idx="1">
-            <a:schemeClr val="lt1"/>
-          </a:fillRef>
-          <a:effectRef idx="0">
-            <a:schemeClr val="accent1"/>
-          </a:effectRef>
-          <a:fontRef idx="minor">
-            <a:schemeClr val="dk1"/>
-          </a:fontRef>
-        </p:style>
         <p:txBody>
           <a:bodyPr wrap="square" rtlCol="0">
             <a:spAutoFit/>
           </a:bodyPr>
           <a:lstStyle/>
           <a:p>
-            <a:endParaRPr lang="pt-BR" dirty="0"/>
-          </a:p>
-        </p:txBody>
-      </p:sp>
-      <p:sp>
-        <p:nvSpPr>
-          <p:cNvPr id="26" name="CaixaDeTexto 25"/>
+            <a:r>
+              <a:rPr lang="en-US" b="1" dirty="0" smtClean="0">
+                <a:effectLst>
+                  <a:outerShdw blurRad="38100" dist="38100" dir="2700000" algn="tl">
+                    <a:srgbClr val="000000">
+                      <a:alpha val="43137"/>
+                    </a:srgbClr>
+                  </a:outerShdw>
+                </a:effectLst>
+              </a:rPr>
+              <a:t>1</a:t>
+            </a:r>
+            <a:endParaRPr lang="pt-BR" b="1" dirty="0">
+              <a:effectLst>
+                <a:outerShdw blurRad="38100" dist="38100" dir="2700000" algn="tl">
+                  <a:srgbClr val="000000">
+                    <a:alpha val="43137"/>
+                  </a:srgbClr>
+                </a:outerShdw>
+              </a:effectLst>
+            </a:endParaRPr>
+          </a:p>
+        </p:txBody>
+      </p:sp>
+      <p:sp>
+        <p:nvSpPr>
+          <p:cNvPr id="38" name="CaixaDeTexto 37"/>
           <p:cNvSpPr txBox="1"/>
           <p:nvPr/>
         </p:nvSpPr>
         <p:spPr>
           <a:xfrm>
-            <a:off x="7032672" y="3203684"/>
-            <a:ext cx="1368152" cy="369332"/>
+            <a:off x="7597320" y="3239610"/>
+            <a:ext cx="432048" cy="369332"/>
           </a:xfrm>
           <a:prstGeom prst="rect">
             <a:avLst/>
           </a:prstGeom>
+          <a:noFill/>
         </p:spPr>
-        <p:style>
-          <a:lnRef idx="2">
-            <a:schemeClr val="accent1"/>
-          </a:lnRef>
-          <a:fillRef idx="1">
-            <a:schemeClr val="lt1"/>
-          </a:fillRef>
-          <a:effectRef idx="0">
-            <a:schemeClr val="accent1"/>
-          </a:effectRef>
-          <a:fontRef idx="minor">
-            <a:schemeClr val="dk1"/>
-          </a:fontRef>
-        </p:style>
         <p:txBody>
           <a:bodyPr wrap="square" rtlCol="0">
             <a:spAutoFit/>
           </a:bodyPr>
           <a:lstStyle/>
           <a:p>
-            <a:endParaRPr lang="pt-BR" dirty="0"/>
-          </a:p>
-        </p:txBody>
-      </p:sp>
-      <p:sp>
-        <p:nvSpPr>
-          <p:cNvPr id="20" name="CaixaDeTexto 19"/>
+            <a:r>
+              <a:rPr lang="en-US" b="1" dirty="0" smtClean="0">
+                <a:effectLst>
+                  <a:outerShdw blurRad="38100" dist="38100" dir="2700000" algn="tl">
+                    <a:srgbClr val="000000">
+                      <a:alpha val="43137"/>
+                    </a:srgbClr>
+                  </a:outerShdw>
+                </a:effectLst>
+              </a:rPr>
+              <a:t>4</a:t>
+            </a:r>
+            <a:endParaRPr lang="pt-BR" b="1" dirty="0">
+              <a:effectLst>
+                <a:outerShdw blurRad="38100" dist="38100" dir="2700000" algn="tl">
+                  <a:srgbClr val="000000">
+                    <a:alpha val="43137"/>
+                  </a:srgbClr>
+                </a:outerShdw>
+              </a:effectLst>
+            </a:endParaRPr>
+          </a:p>
+        </p:txBody>
+      </p:sp>
+      <p:sp>
+        <p:nvSpPr>
+          <p:cNvPr id="39" name="CaixaDeTexto 38"/>
           <p:cNvSpPr txBox="1"/>
           <p:nvPr/>
         </p:nvSpPr>
         <p:spPr>
           <a:xfrm>
-            <a:off x="7032672" y="3861048"/>
-            <a:ext cx="1368152" cy="369332"/>
+            <a:off x="7605214" y="3868942"/>
+            <a:ext cx="432048" cy="369332"/>
           </a:xfrm>
           <a:prstGeom prst="rect">
             <a:avLst/>
           </a:prstGeom>
+          <a:noFill/>
         </p:spPr>
-        <p:style>
-          <a:lnRef idx="2">
-            <a:schemeClr val="accent1"/>
-          </a:lnRef>
-          <a:fillRef idx="1">
-            <a:schemeClr val="lt1"/>
-          </a:fillRef>
-          <a:effectRef idx="0">
-            <a:schemeClr val="accent1"/>
-          </a:effectRef>
-          <a:fontRef idx="minor">
-            <a:schemeClr val="dk1"/>
-          </a:fontRef>
-        </p:style>
         <p:txBody>
           <a:bodyPr wrap="square" rtlCol="0">
             <a:spAutoFit/>
           </a:bodyPr>
           <a:lstStyle/>
           <a:p>
-            <a:endParaRPr lang="pt-BR" dirty="0"/>
+            <a:r>
+              <a:rPr lang="en-US" b="1" dirty="0" smtClean="0">
+                <a:effectLst>
+                  <a:outerShdw blurRad="38100" dist="38100" dir="2700000" algn="tl">
+                    <a:srgbClr val="000000">
+                      <a:alpha val="43137"/>
+                    </a:srgbClr>
+                  </a:outerShdw>
+                </a:effectLst>
+              </a:rPr>
+              <a:t>2</a:t>
+            </a:r>
+            <a:endParaRPr lang="pt-BR" b="1" dirty="0">
+              <a:effectLst>
+                <a:outerShdw blurRad="38100" dist="38100" dir="2700000" algn="tl">
+                  <a:srgbClr val="000000">
+                    <a:alpha val="43137"/>
+                  </a:srgbClr>
+                </a:outerShdw>
+              </a:effectLst>
+            </a:endParaRPr>
           </a:p>
         </p:txBody>
       </p:sp>
     </p:spTree>
     <p:extLst>
       <p:ext uri="{BB962C8B-B14F-4D97-AF65-F5344CB8AC3E}">
-        <p14:creationId xmlns="" xmlns:p14="http://schemas.microsoft.com/office/powerpoint/2010/main" val="644109181"/>
+        <p14:creationId xmlns:p14="http://schemas.microsoft.com/office/powerpoint/2010/main" xmlns="" val="644109181"/>
       </p:ext>
     </p:extLst>
   </p:cSld>

</xml_diff>